<commit_message>
Updated Course documents and lessons 1 and 2
</commit_message>
<xml_diff>
--- a/w1_getting_started/lesson/w1_getting_started.pptx
+++ b/w1_getting_started/lesson/w1_getting_started.pptx
@@ -6695,6 +6695,220 @@
     </pc:docChg>
   </pc:docChgLst>
   <pc:docChgLst>
+    <pc:chgData name="Peter McGinty" userId="138e04b35f3df159" providerId="LiveId" clId="{312476B9-7000-4315-B679-E20443A57BAE}"/>
+    <pc:docChg chg="undo custSel addSld modSld sldOrd modSection">
+      <pc:chgData name="Peter McGinty" userId="138e04b35f3df159" providerId="LiveId" clId="{312476B9-7000-4315-B679-E20443A57BAE}" dt="2023-09-14T20:57:56.042" v="1375" actId="6264"/>
+      <pc:docMkLst>
+        <pc:docMk/>
+      </pc:docMkLst>
+      <pc:sldChg chg="addSp delSp modSp mod chgLayout">
+        <pc:chgData name="Peter McGinty" userId="138e04b35f3df159" providerId="LiveId" clId="{312476B9-7000-4315-B679-E20443A57BAE}" dt="2023-09-14T20:57:56.042" v="1375" actId="6264"/>
+        <pc:sldMkLst>
+          <pc:docMk/>
+          <pc:sldMk cId="3743528606" sldId="256"/>
+        </pc:sldMkLst>
+        <pc:spChg chg="mod ord">
+          <ac:chgData name="Peter McGinty" userId="138e04b35f3df159" providerId="LiveId" clId="{312476B9-7000-4315-B679-E20443A57BAE}" dt="2023-09-14T20:57:56.042" v="1375" actId="6264"/>
+          <ac:spMkLst>
+            <pc:docMk/>
+            <pc:sldMk cId="3743528606" sldId="256"/>
+            <ac:spMk id="2" creationId="{02FEE16B-71B8-43A1-BC00-7A908FE032E6}"/>
+          </ac:spMkLst>
+        </pc:spChg>
+        <pc:spChg chg="add del mod">
+          <ac:chgData name="Peter McGinty" userId="138e04b35f3df159" providerId="LiveId" clId="{312476B9-7000-4315-B679-E20443A57BAE}" dt="2023-09-14T20:55:37.342" v="1352" actId="6264"/>
+          <ac:spMkLst>
+            <pc:docMk/>
+            <pc:sldMk cId="3743528606" sldId="256"/>
+            <ac:spMk id="3" creationId="{4CA13582-9D6E-7089-7CF5-63A6683B0D54}"/>
+          </ac:spMkLst>
+        </pc:spChg>
+        <pc:spChg chg="add del mod">
+          <ac:chgData name="Peter McGinty" userId="138e04b35f3df159" providerId="LiveId" clId="{312476B9-7000-4315-B679-E20443A57BAE}" dt="2023-09-14T20:37:02.958" v="977" actId="6264"/>
+          <ac:spMkLst>
+            <pc:docMk/>
+            <pc:sldMk cId="3743528606" sldId="256"/>
+            <ac:spMk id="3" creationId="{FA2A4782-11D7-220C-9816-ED3FF075335B}"/>
+          </ac:spMkLst>
+        </pc:spChg>
+        <pc:spChg chg="del mod ord">
+          <ac:chgData name="Peter McGinty" userId="138e04b35f3df159" providerId="LiveId" clId="{312476B9-7000-4315-B679-E20443A57BAE}" dt="2023-09-14T20:57:56.042" v="1375" actId="6264"/>
+          <ac:spMkLst>
+            <pc:docMk/>
+            <pc:sldMk cId="3743528606" sldId="256"/>
+            <ac:spMk id="4" creationId="{C0DDB592-654E-448B-8AC2-092C2701D126}"/>
+          </ac:spMkLst>
+        </pc:spChg>
+        <pc:spChg chg="mod ord">
+          <ac:chgData name="Peter McGinty" userId="138e04b35f3df159" providerId="LiveId" clId="{312476B9-7000-4315-B679-E20443A57BAE}" dt="2023-09-14T20:57:56.042" v="1375" actId="6264"/>
+          <ac:spMkLst>
+            <pc:docMk/>
+            <pc:sldMk cId="3743528606" sldId="256"/>
+            <ac:spMk id="5" creationId="{CABFAD0D-ABB2-F404-401F-50B24FC81F5A}"/>
+          </ac:spMkLst>
+        </pc:spChg>
+        <pc:spChg chg="add del mod">
+          <ac:chgData name="Peter McGinty" userId="138e04b35f3df159" providerId="LiveId" clId="{312476B9-7000-4315-B679-E20443A57BAE}" dt="2023-09-14T20:55:37.342" v="1352" actId="6264"/>
+          <ac:spMkLst>
+            <pc:docMk/>
+            <pc:sldMk cId="3743528606" sldId="256"/>
+            <ac:spMk id="6" creationId="{84D7B143-6091-9C72-2D7A-D1E991FCF0A1}"/>
+          </ac:spMkLst>
+        </pc:spChg>
+        <pc:spChg chg="add del mod">
+          <ac:chgData name="Peter McGinty" userId="138e04b35f3df159" providerId="LiveId" clId="{312476B9-7000-4315-B679-E20443A57BAE}" dt="2023-09-14T20:37:02.958" v="977" actId="6264"/>
+          <ac:spMkLst>
+            <pc:docMk/>
+            <pc:sldMk cId="3743528606" sldId="256"/>
+            <ac:spMk id="6" creationId="{AFD50D7A-8FFA-9E8C-A06A-075158FFAB60}"/>
+          </ac:spMkLst>
+        </pc:spChg>
+        <pc:spChg chg="add del mod">
+          <ac:chgData name="Peter McGinty" userId="138e04b35f3df159" providerId="LiveId" clId="{312476B9-7000-4315-B679-E20443A57BAE}" dt="2023-09-14T20:55:37.342" v="1352" actId="6264"/>
+          <ac:spMkLst>
+            <pc:docMk/>
+            <pc:sldMk cId="3743528606" sldId="256"/>
+            <ac:spMk id="7" creationId="{03A5FD4E-BD1C-8A0A-9047-A9587A3A04E2}"/>
+          </ac:spMkLst>
+        </pc:spChg>
+        <pc:spChg chg="add del mod">
+          <ac:chgData name="Peter McGinty" userId="138e04b35f3df159" providerId="LiveId" clId="{312476B9-7000-4315-B679-E20443A57BAE}" dt="2023-09-14T20:37:02.958" v="977" actId="6264"/>
+          <ac:spMkLst>
+            <pc:docMk/>
+            <pc:sldMk cId="3743528606" sldId="256"/>
+            <ac:spMk id="7" creationId="{1B75BBA1-3958-F774-CC8A-D26B98962739}"/>
+          </ac:spMkLst>
+        </pc:spChg>
+        <pc:spChg chg="add del mod">
+          <ac:chgData name="Peter McGinty" userId="138e04b35f3df159" providerId="LiveId" clId="{312476B9-7000-4315-B679-E20443A57BAE}" dt="2023-09-14T20:57:56.042" v="1375" actId="6264"/>
+          <ac:spMkLst>
+            <pc:docMk/>
+            <pc:sldMk cId="3743528606" sldId="256"/>
+            <ac:spMk id="8" creationId="{3D7C11C1-D6FD-B1F6-79F4-A498810C2CEB}"/>
+          </ac:spMkLst>
+        </pc:spChg>
+        <pc:spChg chg="add del mod">
+          <ac:chgData name="Peter McGinty" userId="138e04b35f3df159" providerId="LiveId" clId="{312476B9-7000-4315-B679-E20443A57BAE}" dt="2023-09-14T20:57:56.042" v="1375" actId="6264"/>
+          <ac:spMkLst>
+            <pc:docMk/>
+            <pc:sldMk cId="3743528606" sldId="256"/>
+            <ac:spMk id="9" creationId="{4665C5D1-2A3A-EFC0-72FF-1A47296FAB86}"/>
+          </ac:spMkLst>
+        </pc:spChg>
+        <pc:spChg chg="add mod ord">
+          <ac:chgData name="Peter McGinty" userId="138e04b35f3df159" providerId="LiveId" clId="{312476B9-7000-4315-B679-E20443A57BAE}" dt="2023-09-14T20:57:56.042" v="1375" actId="6264"/>
+          <ac:spMkLst>
+            <pc:docMk/>
+            <pc:sldMk cId="3743528606" sldId="256"/>
+            <ac:spMk id="10" creationId="{4468E1CF-E2E0-7FFE-9060-BEFAF0CCAFA9}"/>
+          </ac:spMkLst>
+        </pc:spChg>
+      </pc:sldChg>
+      <pc:sldChg chg="addSp delSp modSp new mod chgLayout">
+        <pc:chgData name="Peter McGinty" userId="138e04b35f3df159" providerId="LiveId" clId="{312476B9-7000-4315-B679-E20443A57BAE}" dt="2023-09-14T20:50:22.188" v="1351" actId="20577"/>
+        <pc:sldMkLst>
+          <pc:docMk/>
+          <pc:sldMk cId="1668931413" sldId="338"/>
+        </pc:sldMkLst>
+        <pc:spChg chg="mod ord">
+          <ac:chgData name="Peter McGinty" userId="138e04b35f3df159" providerId="LiveId" clId="{312476B9-7000-4315-B679-E20443A57BAE}" dt="2023-09-14T20:39:02.200" v="994" actId="6264"/>
+          <ac:spMkLst>
+            <pc:docMk/>
+            <pc:sldMk cId="1668931413" sldId="338"/>
+            <ac:spMk id="2" creationId="{9584CB32-872D-1D5A-167E-CBA510F179ED}"/>
+          </ac:spMkLst>
+        </pc:spChg>
+        <pc:spChg chg="mod ord">
+          <ac:chgData name="Peter McGinty" userId="138e04b35f3df159" providerId="LiveId" clId="{312476B9-7000-4315-B679-E20443A57BAE}" dt="2023-09-14T20:50:22.188" v="1351" actId="20577"/>
+          <ac:spMkLst>
+            <pc:docMk/>
+            <pc:sldMk cId="1668931413" sldId="338"/>
+            <ac:spMk id="3" creationId="{E72FD94C-E91A-C7B0-215E-A8BC855D7748}"/>
+          </ac:spMkLst>
+        </pc:spChg>
+        <pc:spChg chg="mod ord">
+          <ac:chgData name="Peter McGinty" userId="138e04b35f3df159" providerId="LiveId" clId="{312476B9-7000-4315-B679-E20443A57BAE}" dt="2023-09-14T20:39:02.200" v="994" actId="6264"/>
+          <ac:spMkLst>
+            <pc:docMk/>
+            <pc:sldMk cId="1668931413" sldId="338"/>
+            <ac:spMk id="4" creationId="{1433D1C5-2A3C-7FA4-1B0E-90C1977870E8}"/>
+          </ac:spMkLst>
+        </pc:spChg>
+        <pc:spChg chg="add del mod">
+          <ac:chgData name="Peter McGinty" userId="138e04b35f3df159" providerId="LiveId" clId="{312476B9-7000-4315-B679-E20443A57BAE}" dt="2023-09-14T20:39:02.200" v="994" actId="6264"/>
+          <ac:spMkLst>
+            <pc:docMk/>
+            <pc:sldMk cId="1668931413" sldId="338"/>
+            <ac:spMk id="5" creationId="{388B3284-3716-4BDE-F334-6237E4A03233}"/>
+          </ac:spMkLst>
+        </pc:spChg>
+        <pc:spChg chg="add del mod">
+          <ac:chgData name="Peter McGinty" userId="138e04b35f3df159" providerId="LiveId" clId="{312476B9-7000-4315-B679-E20443A57BAE}" dt="2023-09-14T20:39:02.200" v="994" actId="6264"/>
+          <ac:spMkLst>
+            <pc:docMk/>
+            <pc:sldMk cId="1668931413" sldId="338"/>
+            <ac:spMk id="6" creationId="{B07500C9-0DF1-6A3C-2F72-B0787610AFE2}"/>
+          </ac:spMkLst>
+        </pc:spChg>
+        <pc:spChg chg="add del mod">
+          <ac:chgData name="Peter McGinty" userId="138e04b35f3df159" providerId="LiveId" clId="{312476B9-7000-4315-B679-E20443A57BAE}" dt="2023-09-14T20:39:02.200" v="994" actId="6264"/>
+          <ac:spMkLst>
+            <pc:docMk/>
+            <pc:sldMk cId="1668931413" sldId="338"/>
+            <ac:spMk id="7" creationId="{BBF7FCAE-6D34-2A66-9268-939FEEF07D38}"/>
+          </ac:spMkLst>
+        </pc:spChg>
+      </pc:sldChg>
+      <pc:sldChg chg="modSp new mod ord">
+        <pc:chgData name="Peter McGinty" userId="138e04b35f3df159" providerId="LiveId" clId="{312476B9-7000-4315-B679-E20443A57BAE}" dt="2023-09-14T20:48:42.337" v="1322" actId="20577"/>
+        <pc:sldMkLst>
+          <pc:docMk/>
+          <pc:sldMk cId="3767889091" sldId="339"/>
+        </pc:sldMkLst>
+        <pc:spChg chg="mod">
+          <ac:chgData name="Peter McGinty" userId="138e04b35f3df159" providerId="LiveId" clId="{312476B9-7000-4315-B679-E20443A57BAE}" dt="2023-09-14T20:45:24.917" v="1200" actId="20577"/>
+          <ac:spMkLst>
+            <pc:docMk/>
+            <pc:sldMk cId="3767889091" sldId="339"/>
+            <ac:spMk id="2" creationId="{D38BC2C6-189D-14CB-B29A-B3F0AE161D35}"/>
+          </ac:spMkLst>
+        </pc:spChg>
+        <pc:spChg chg="mod">
+          <ac:chgData name="Peter McGinty" userId="138e04b35f3df159" providerId="LiveId" clId="{312476B9-7000-4315-B679-E20443A57BAE}" dt="2023-09-14T20:48:42.337" v="1322" actId="20577"/>
+          <ac:spMkLst>
+            <pc:docMk/>
+            <pc:sldMk cId="3767889091" sldId="339"/>
+            <ac:spMk id="3" creationId="{C352AE06-2706-0A14-4C1E-A7014F682135}"/>
+          </ac:spMkLst>
+        </pc:spChg>
+      </pc:sldChg>
+    </pc:docChg>
+  </pc:docChgLst>
+  <pc:docChgLst>
+    <pc:chgData name="Peter McGinty" userId="138e04b35f3df159" providerId="LiveId" clId="{CC732293-7059-5E4E-BD85-651F87A7A2FF}"/>
+    <pc:docChg chg="custSel modSld modSection">
+      <pc:chgData name="Peter McGinty" userId="138e04b35f3df159" providerId="LiveId" clId="{CC732293-7059-5E4E-BD85-651F87A7A2FF}" dt="2021-08-16T05:35:50.756" v="26" actId="17846"/>
+      <pc:docMkLst>
+        <pc:docMk/>
+      </pc:docMkLst>
+      <pc:sldChg chg="modSp mod">
+        <pc:chgData name="Peter McGinty" userId="138e04b35f3df159" providerId="LiveId" clId="{CC732293-7059-5E4E-BD85-651F87A7A2FF}" dt="2021-08-16T05:34:47.539" v="25"/>
+        <pc:sldMkLst>
+          <pc:docMk/>
+          <pc:sldMk cId="14562698" sldId="263"/>
+        </pc:sldMkLst>
+        <pc:spChg chg="mod">
+          <ac:chgData name="Peter McGinty" userId="138e04b35f3df159" providerId="LiveId" clId="{CC732293-7059-5E4E-BD85-651F87A7A2FF}" dt="2021-08-16T05:34:47.539" v="25"/>
+          <ac:spMkLst>
+            <pc:docMk/>
+            <pc:sldMk cId="14562698" sldId="263"/>
+            <ac:spMk id="2" creationId="{C9C54F27-F54E-40C1-AB86-2A9850D04493}"/>
+          </ac:spMkLst>
+        </pc:spChg>
+      </pc:sldChg>
+    </pc:docChg>
+  </pc:docChgLst>
+  <pc:docChgLst>
     <pc:chgData name="Peter McGinty" userId="138e04b35f3df159" providerId="LiveId" clId="{B4247C41-06B2-4F78-B774-55EDA9C86B32}"/>
     <pc:docChg chg="modSld modNotesMaster">
       <pc:chgData name="Peter McGinty" userId="138e04b35f3df159" providerId="LiveId" clId="{B4247C41-06B2-4F78-B774-55EDA9C86B32}" dt="2022-06-02T09:47:33.034" v="1"/>
@@ -6721,220 +6935,6 @@
           <pc:docMk/>
           <pc:sldMk cId="2011169441" sldId="303"/>
         </pc:sldMkLst>
-      </pc:sldChg>
-    </pc:docChg>
-  </pc:docChgLst>
-  <pc:docChgLst>
-    <pc:chgData name="Peter McGinty" userId="138e04b35f3df159" providerId="LiveId" clId="{CC732293-7059-5E4E-BD85-651F87A7A2FF}"/>
-    <pc:docChg chg="custSel modSld modSection">
-      <pc:chgData name="Peter McGinty" userId="138e04b35f3df159" providerId="LiveId" clId="{CC732293-7059-5E4E-BD85-651F87A7A2FF}" dt="2021-08-16T05:35:50.756" v="26" actId="17846"/>
-      <pc:docMkLst>
-        <pc:docMk/>
-      </pc:docMkLst>
-      <pc:sldChg chg="modSp mod">
-        <pc:chgData name="Peter McGinty" userId="138e04b35f3df159" providerId="LiveId" clId="{CC732293-7059-5E4E-BD85-651F87A7A2FF}" dt="2021-08-16T05:34:47.539" v="25"/>
-        <pc:sldMkLst>
-          <pc:docMk/>
-          <pc:sldMk cId="14562698" sldId="263"/>
-        </pc:sldMkLst>
-        <pc:spChg chg="mod">
-          <ac:chgData name="Peter McGinty" userId="138e04b35f3df159" providerId="LiveId" clId="{CC732293-7059-5E4E-BD85-651F87A7A2FF}" dt="2021-08-16T05:34:47.539" v="25"/>
-          <ac:spMkLst>
-            <pc:docMk/>
-            <pc:sldMk cId="14562698" sldId="263"/>
-            <ac:spMk id="2" creationId="{C9C54F27-F54E-40C1-AB86-2A9850D04493}"/>
-          </ac:spMkLst>
-        </pc:spChg>
-      </pc:sldChg>
-    </pc:docChg>
-  </pc:docChgLst>
-  <pc:docChgLst>
-    <pc:chgData name="Peter McGinty" userId="138e04b35f3df159" providerId="LiveId" clId="{312476B9-7000-4315-B679-E20443A57BAE}"/>
-    <pc:docChg chg="undo custSel addSld modSld sldOrd modSection">
-      <pc:chgData name="Peter McGinty" userId="138e04b35f3df159" providerId="LiveId" clId="{312476B9-7000-4315-B679-E20443A57BAE}" dt="2023-09-14T20:57:56.042" v="1375" actId="6264"/>
-      <pc:docMkLst>
-        <pc:docMk/>
-      </pc:docMkLst>
-      <pc:sldChg chg="addSp delSp modSp mod chgLayout">
-        <pc:chgData name="Peter McGinty" userId="138e04b35f3df159" providerId="LiveId" clId="{312476B9-7000-4315-B679-E20443A57BAE}" dt="2023-09-14T20:57:56.042" v="1375" actId="6264"/>
-        <pc:sldMkLst>
-          <pc:docMk/>
-          <pc:sldMk cId="3743528606" sldId="256"/>
-        </pc:sldMkLst>
-        <pc:spChg chg="mod ord">
-          <ac:chgData name="Peter McGinty" userId="138e04b35f3df159" providerId="LiveId" clId="{312476B9-7000-4315-B679-E20443A57BAE}" dt="2023-09-14T20:57:56.042" v="1375" actId="6264"/>
-          <ac:spMkLst>
-            <pc:docMk/>
-            <pc:sldMk cId="3743528606" sldId="256"/>
-            <ac:spMk id="2" creationId="{02FEE16B-71B8-43A1-BC00-7A908FE032E6}"/>
-          </ac:spMkLst>
-        </pc:spChg>
-        <pc:spChg chg="add del mod">
-          <ac:chgData name="Peter McGinty" userId="138e04b35f3df159" providerId="LiveId" clId="{312476B9-7000-4315-B679-E20443A57BAE}" dt="2023-09-14T20:55:37.342" v="1352" actId="6264"/>
-          <ac:spMkLst>
-            <pc:docMk/>
-            <pc:sldMk cId="3743528606" sldId="256"/>
-            <ac:spMk id="3" creationId="{4CA13582-9D6E-7089-7CF5-63A6683B0D54}"/>
-          </ac:spMkLst>
-        </pc:spChg>
-        <pc:spChg chg="add del mod">
-          <ac:chgData name="Peter McGinty" userId="138e04b35f3df159" providerId="LiveId" clId="{312476B9-7000-4315-B679-E20443A57BAE}" dt="2023-09-14T20:37:02.958" v="977" actId="6264"/>
-          <ac:spMkLst>
-            <pc:docMk/>
-            <pc:sldMk cId="3743528606" sldId="256"/>
-            <ac:spMk id="3" creationId="{FA2A4782-11D7-220C-9816-ED3FF075335B}"/>
-          </ac:spMkLst>
-        </pc:spChg>
-        <pc:spChg chg="del mod ord">
-          <ac:chgData name="Peter McGinty" userId="138e04b35f3df159" providerId="LiveId" clId="{312476B9-7000-4315-B679-E20443A57BAE}" dt="2023-09-14T20:57:56.042" v="1375" actId="6264"/>
-          <ac:spMkLst>
-            <pc:docMk/>
-            <pc:sldMk cId="3743528606" sldId="256"/>
-            <ac:spMk id="4" creationId="{C0DDB592-654E-448B-8AC2-092C2701D126}"/>
-          </ac:spMkLst>
-        </pc:spChg>
-        <pc:spChg chg="mod ord">
-          <ac:chgData name="Peter McGinty" userId="138e04b35f3df159" providerId="LiveId" clId="{312476B9-7000-4315-B679-E20443A57BAE}" dt="2023-09-14T20:57:56.042" v="1375" actId="6264"/>
-          <ac:spMkLst>
-            <pc:docMk/>
-            <pc:sldMk cId="3743528606" sldId="256"/>
-            <ac:spMk id="5" creationId="{CABFAD0D-ABB2-F404-401F-50B24FC81F5A}"/>
-          </ac:spMkLst>
-        </pc:spChg>
-        <pc:spChg chg="add del mod">
-          <ac:chgData name="Peter McGinty" userId="138e04b35f3df159" providerId="LiveId" clId="{312476B9-7000-4315-B679-E20443A57BAE}" dt="2023-09-14T20:55:37.342" v="1352" actId="6264"/>
-          <ac:spMkLst>
-            <pc:docMk/>
-            <pc:sldMk cId="3743528606" sldId="256"/>
-            <ac:spMk id="6" creationId="{84D7B143-6091-9C72-2D7A-D1E991FCF0A1}"/>
-          </ac:spMkLst>
-        </pc:spChg>
-        <pc:spChg chg="add del mod">
-          <ac:chgData name="Peter McGinty" userId="138e04b35f3df159" providerId="LiveId" clId="{312476B9-7000-4315-B679-E20443A57BAE}" dt="2023-09-14T20:37:02.958" v="977" actId="6264"/>
-          <ac:spMkLst>
-            <pc:docMk/>
-            <pc:sldMk cId="3743528606" sldId="256"/>
-            <ac:spMk id="6" creationId="{AFD50D7A-8FFA-9E8C-A06A-075158FFAB60}"/>
-          </ac:spMkLst>
-        </pc:spChg>
-        <pc:spChg chg="add del mod">
-          <ac:chgData name="Peter McGinty" userId="138e04b35f3df159" providerId="LiveId" clId="{312476B9-7000-4315-B679-E20443A57BAE}" dt="2023-09-14T20:55:37.342" v="1352" actId="6264"/>
-          <ac:spMkLst>
-            <pc:docMk/>
-            <pc:sldMk cId="3743528606" sldId="256"/>
-            <ac:spMk id="7" creationId="{03A5FD4E-BD1C-8A0A-9047-A9587A3A04E2}"/>
-          </ac:spMkLst>
-        </pc:spChg>
-        <pc:spChg chg="add del mod">
-          <ac:chgData name="Peter McGinty" userId="138e04b35f3df159" providerId="LiveId" clId="{312476B9-7000-4315-B679-E20443A57BAE}" dt="2023-09-14T20:37:02.958" v="977" actId="6264"/>
-          <ac:spMkLst>
-            <pc:docMk/>
-            <pc:sldMk cId="3743528606" sldId="256"/>
-            <ac:spMk id="7" creationId="{1B75BBA1-3958-F774-CC8A-D26B98962739}"/>
-          </ac:spMkLst>
-        </pc:spChg>
-        <pc:spChg chg="add del mod">
-          <ac:chgData name="Peter McGinty" userId="138e04b35f3df159" providerId="LiveId" clId="{312476B9-7000-4315-B679-E20443A57BAE}" dt="2023-09-14T20:57:56.042" v="1375" actId="6264"/>
-          <ac:spMkLst>
-            <pc:docMk/>
-            <pc:sldMk cId="3743528606" sldId="256"/>
-            <ac:spMk id="8" creationId="{3D7C11C1-D6FD-B1F6-79F4-A498810C2CEB}"/>
-          </ac:spMkLst>
-        </pc:spChg>
-        <pc:spChg chg="add del mod">
-          <ac:chgData name="Peter McGinty" userId="138e04b35f3df159" providerId="LiveId" clId="{312476B9-7000-4315-B679-E20443A57BAE}" dt="2023-09-14T20:57:56.042" v="1375" actId="6264"/>
-          <ac:spMkLst>
-            <pc:docMk/>
-            <pc:sldMk cId="3743528606" sldId="256"/>
-            <ac:spMk id="9" creationId="{4665C5D1-2A3A-EFC0-72FF-1A47296FAB86}"/>
-          </ac:spMkLst>
-        </pc:spChg>
-        <pc:spChg chg="add mod ord">
-          <ac:chgData name="Peter McGinty" userId="138e04b35f3df159" providerId="LiveId" clId="{312476B9-7000-4315-B679-E20443A57BAE}" dt="2023-09-14T20:57:56.042" v="1375" actId="6264"/>
-          <ac:spMkLst>
-            <pc:docMk/>
-            <pc:sldMk cId="3743528606" sldId="256"/>
-            <ac:spMk id="10" creationId="{4468E1CF-E2E0-7FFE-9060-BEFAF0CCAFA9}"/>
-          </ac:spMkLst>
-        </pc:spChg>
-      </pc:sldChg>
-      <pc:sldChg chg="addSp delSp modSp new mod chgLayout">
-        <pc:chgData name="Peter McGinty" userId="138e04b35f3df159" providerId="LiveId" clId="{312476B9-7000-4315-B679-E20443A57BAE}" dt="2023-09-14T20:50:22.188" v="1351" actId="20577"/>
-        <pc:sldMkLst>
-          <pc:docMk/>
-          <pc:sldMk cId="1668931413" sldId="338"/>
-        </pc:sldMkLst>
-        <pc:spChg chg="mod ord">
-          <ac:chgData name="Peter McGinty" userId="138e04b35f3df159" providerId="LiveId" clId="{312476B9-7000-4315-B679-E20443A57BAE}" dt="2023-09-14T20:39:02.200" v="994" actId="6264"/>
-          <ac:spMkLst>
-            <pc:docMk/>
-            <pc:sldMk cId="1668931413" sldId="338"/>
-            <ac:spMk id="2" creationId="{9584CB32-872D-1D5A-167E-CBA510F179ED}"/>
-          </ac:spMkLst>
-        </pc:spChg>
-        <pc:spChg chg="mod ord">
-          <ac:chgData name="Peter McGinty" userId="138e04b35f3df159" providerId="LiveId" clId="{312476B9-7000-4315-B679-E20443A57BAE}" dt="2023-09-14T20:50:22.188" v="1351" actId="20577"/>
-          <ac:spMkLst>
-            <pc:docMk/>
-            <pc:sldMk cId="1668931413" sldId="338"/>
-            <ac:spMk id="3" creationId="{E72FD94C-E91A-C7B0-215E-A8BC855D7748}"/>
-          </ac:spMkLst>
-        </pc:spChg>
-        <pc:spChg chg="mod ord">
-          <ac:chgData name="Peter McGinty" userId="138e04b35f3df159" providerId="LiveId" clId="{312476B9-7000-4315-B679-E20443A57BAE}" dt="2023-09-14T20:39:02.200" v="994" actId="6264"/>
-          <ac:spMkLst>
-            <pc:docMk/>
-            <pc:sldMk cId="1668931413" sldId="338"/>
-            <ac:spMk id="4" creationId="{1433D1C5-2A3C-7FA4-1B0E-90C1977870E8}"/>
-          </ac:spMkLst>
-        </pc:spChg>
-        <pc:spChg chg="add del mod">
-          <ac:chgData name="Peter McGinty" userId="138e04b35f3df159" providerId="LiveId" clId="{312476B9-7000-4315-B679-E20443A57BAE}" dt="2023-09-14T20:39:02.200" v="994" actId="6264"/>
-          <ac:spMkLst>
-            <pc:docMk/>
-            <pc:sldMk cId="1668931413" sldId="338"/>
-            <ac:spMk id="5" creationId="{388B3284-3716-4BDE-F334-6237E4A03233}"/>
-          </ac:spMkLst>
-        </pc:spChg>
-        <pc:spChg chg="add del mod">
-          <ac:chgData name="Peter McGinty" userId="138e04b35f3df159" providerId="LiveId" clId="{312476B9-7000-4315-B679-E20443A57BAE}" dt="2023-09-14T20:39:02.200" v="994" actId="6264"/>
-          <ac:spMkLst>
-            <pc:docMk/>
-            <pc:sldMk cId="1668931413" sldId="338"/>
-            <ac:spMk id="6" creationId="{B07500C9-0DF1-6A3C-2F72-B0787610AFE2}"/>
-          </ac:spMkLst>
-        </pc:spChg>
-        <pc:spChg chg="add del mod">
-          <ac:chgData name="Peter McGinty" userId="138e04b35f3df159" providerId="LiveId" clId="{312476B9-7000-4315-B679-E20443A57BAE}" dt="2023-09-14T20:39:02.200" v="994" actId="6264"/>
-          <ac:spMkLst>
-            <pc:docMk/>
-            <pc:sldMk cId="1668931413" sldId="338"/>
-            <ac:spMk id="7" creationId="{BBF7FCAE-6D34-2A66-9268-939FEEF07D38}"/>
-          </ac:spMkLst>
-        </pc:spChg>
-      </pc:sldChg>
-      <pc:sldChg chg="modSp new mod ord">
-        <pc:chgData name="Peter McGinty" userId="138e04b35f3df159" providerId="LiveId" clId="{312476B9-7000-4315-B679-E20443A57BAE}" dt="2023-09-14T20:48:42.337" v="1322" actId="20577"/>
-        <pc:sldMkLst>
-          <pc:docMk/>
-          <pc:sldMk cId="3767889091" sldId="339"/>
-        </pc:sldMkLst>
-        <pc:spChg chg="mod">
-          <ac:chgData name="Peter McGinty" userId="138e04b35f3df159" providerId="LiveId" clId="{312476B9-7000-4315-B679-E20443A57BAE}" dt="2023-09-14T20:45:24.917" v="1200" actId="20577"/>
-          <ac:spMkLst>
-            <pc:docMk/>
-            <pc:sldMk cId="3767889091" sldId="339"/>
-            <ac:spMk id="2" creationId="{D38BC2C6-189D-14CB-B29A-B3F0AE161D35}"/>
-          </ac:spMkLst>
-        </pc:spChg>
-        <pc:spChg chg="mod">
-          <ac:chgData name="Peter McGinty" userId="138e04b35f3df159" providerId="LiveId" clId="{312476B9-7000-4315-B679-E20443A57BAE}" dt="2023-09-14T20:48:42.337" v="1322" actId="20577"/>
-          <ac:spMkLst>
-            <pc:docMk/>
-            <pc:sldMk cId="3767889091" sldId="339"/>
-            <ac:spMk id="3" creationId="{C352AE06-2706-0A14-4C1E-A7014F682135}"/>
-          </ac:spMkLst>
-        </pc:spChg>
       </pc:sldChg>
     </pc:docChg>
   </pc:docChgLst>
@@ -8509,7 +8509,7 @@
           <a:p>
             <a:fld id="{0ADE22A4-FCF5-4D1E-BEB2-C1374E4FA94D}" type="datetimeFigureOut">
               <a:rPr lang="en-GB" smtClean="0"/>
-              <a:t>22/09/2024</a:t>
+              <a:t>20/09/2025</a:t>
             </a:fld>
             <a:endParaRPr lang="en-GB"/>
           </a:p>
@@ -8687,7 +8687,7 @@
           <a:p>
             <a:fld id="{1EBD4E1B-2196-4B1C-A7F6-845369997D7F}" type="datetimeFigureOut">
               <a:rPr lang="en-GB" smtClean="0"/>
-              <a:t>22/09/2024</a:t>
+              <a:t>20/09/2025</a:t>
             </a:fld>
             <a:endParaRPr lang="en-GB"/>
           </a:p>
@@ -9231,7 +9231,7 @@
           <a:p>
             <a:fld id="{032D7D9B-97CD-41EE-AFD4-23E587A95628}" type="datetime1">
               <a:rPr lang="en-GB" smtClean="0"/>
-              <a:t>22/09/2024</a:t>
+              <a:t>20/09/2025</a:t>
             </a:fld>
             <a:endParaRPr lang="en-GB"/>
           </a:p>
@@ -9401,7 +9401,7 @@
           <a:p>
             <a:fld id="{3A43554D-8CE2-4B88-9255-13250F2920ED}" type="datetime1">
               <a:rPr lang="en-GB" smtClean="0"/>
-              <a:t>22/09/2024</a:t>
+              <a:t>20/09/2025</a:t>
             </a:fld>
             <a:endParaRPr lang="en-GB"/>
           </a:p>
@@ -9581,7 +9581,7 @@
           <a:p>
             <a:fld id="{6B0429B1-6228-4F8F-80A1-4F927745A267}" type="datetime1">
               <a:rPr lang="en-GB" smtClean="0"/>
-              <a:t>22/09/2024</a:t>
+              <a:t>20/09/2025</a:t>
             </a:fld>
             <a:endParaRPr lang="en-GB"/>
           </a:p>
@@ -9751,7 +9751,7 @@
           <a:p>
             <a:fld id="{2AC9E5FF-5BA3-4167-BF46-91F110E88ED9}" type="datetime1">
               <a:rPr lang="en-GB" smtClean="0"/>
-              <a:t>22/09/2024</a:t>
+              <a:t>20/09/2025</a:t>
             </a:fld>
             <a:endParaRPr lang="en-GB"/>
           </a:p>
@@ -9997,7 +9997,7 @@
           <a:p>
             <a:fld id="{ADE867AE-2098-4CFA-9C77-73DACCC7A261}" type="datetime1">
               <a:rPr lang="en-GB" smtClean="0"/>
-              <a:t>22/09/2024</a:t>
+              <a:t>20/09/2025</a:t>
             </a:fld>
             <a:endParaRPr lang="en-GB"/>
           </a:p>
@@ -10229,7 +10229,7 @@
           <a:p>
             <a:fld id="{9519D9DF-7486-45EB-9B11-2DAFDA131CED}" type="datetime1">
               <a:rPr lang="en-GB" smtClean="0"/>
-              <a:t>22/09/2024</a:t>
+              <a:t>20/09/2025</a:t>
             </a:fld>
             <a:endParaRPr lang="en-GB"/>
           </a:p>
@@ -10596,7 +10596,7 @@
           <a:p>
             <a:fld id="{772D7B90-E305-49AA-B0C0-63D524E0EE89}" type="datetime1">
               <a:rPr lang="en-GB" smtClean="0"/>
-              <a:t>22/09/2024</a:t>
+              <a:t>20/09/2025</a:t>
             </a:fld>
             <a:endParaRPr lang="en-GB"/>
           </a:p>
@@ -10714,7 +10714,7 @@
           <a:p>
             <a:fld id="{38CE41DC-A33E-4CFF-864D-5082C5D04126}" type="datetime1">
               <a:rPr lang="en-GB" smtClean="0"/>
-              <a:t>22/09/2024</a:t>
+              <a:t>20/09/2025</a:t>
             </a:fld>
             <a:endParaRPr lang="en-GB"/>
           </a:p>
@@ -10809,7 +10809,7 @@
           <a:p>
             <a:fld id="{4F366F1F-D69A-4B85-AACF-E4BF17C53E3E}" type="datetime1">
               <a:rPr lang="en-GB" smtClean="0"/>
-              <a:t>22/09/2024</a:t>
+              <a:t>20/09/2025</a:t>
             </a:fld>
             <a:endParaRPr lang="en-GB"/>
           </a:p>
@@ -11086,7 +11086,7 @@
           <a:p>
             <a:fld id="{B648F8D4-DA3B-452A-A1B4-9DF41DC6EB2F}" type="datetime1">
               <a:rPr lang="en-GB" smtClean="0"/>
-              <a:t>22/09/2024</a:t>
+              <a:t>20/09/2025</a:t>
             </a:fld>
             <a:endParaRPr lang="en-GB"/>
           </a:p>
@@ -11343,7 +11343,7 @@
           <a:p>
             <a:fld id="{53523049-F1E9-4073-859B-C7B886349D41}" type="datetime1">
               <a:rPr lang="en-GB" smtClean="0"/>
-              <a:t>22/09/2024</a:t>
+              <a:t>20/09/2025</a:t>
             </a:fld>
             <a:endParaRPr lang="en-GB"/>
           </a:p>
@@ -11556,7 +11556,7 @@
           <a:p>
             <a:fld id="{15A00800-0EDE-4D1D-AAD9-32DE9101FB14}" type="datetime1">
               <a:rPr lang="en-GB" smtClean="0"/>
-              <a:t>22/09/2024</a:t>
+              <a:t>20/09/2025</a:t>
             </a:fld>
             <a:endParaRPr lang="en-GB"/>
           </a:p>
@@ -11986,27 +11986,20 @@
         </p:spPr>
         <p:txBody>
           <a:bodyPr>
-            <a:normAutofit fontScale="90000"/>
+            <a:normAutofit/>
           </a:bodyPr>
           <a:lstStyle/>
           <a:p>
             <a:r>
               <a:rPr lang="en-GB" dirty="0"/>
-              <a:t>Coding for Linguists</a:t>
+              <a:t>week 1</a:t>
             </a:r>
             <a:br>
               <a:rPr lang="en-GB" dirty="0"/>
             </a:br>
-            <a:br>
-              <a:rPr lang="en-GB"/>
-            </a:br>
-            <a:r>
-              <a:rPr lang="en-GB"/>
-              <a:t>week 1</a:t>
-            </a:r>
-            <a:r>
-              <a:rPr lang="en-GB" dirty="0"/>
-              <a:t>. Getting Started</a:t>
+            <a:r>
+              <a:rPr lang="en-GB" dirty="0"/>
+              <a:t>Getting Started</a:t>
             </a:r>
           </a:p>
         </p:txBody>
@@ -14467,7 +14460,7 @@
           <a:p>
             <a:r>
               <a:rPr lang="en-GB" dirty="0"/>
-              <a:t>A digital computer is a machine that inputs data and instructions encoded in binary and outputs a result encoded in binary</a:t>
+              <a:t>At their most basic level, modern digital computers are machines that input and output binary numbers</a:t>
             </a:r>
           </a:p>
           <a:p>
@@ -17007,12 +17000,9 @@
             </a:r>
             <a:r>
               <a:rPr lang="en-GB" dirty="0"/>
-              <a:t> to solve it </a:t>
-            </a:r>
-            <a:r>
-              <a:rPr lang="en-GB" i="1" dirty="0"/>
-              <a:t>– question: what is an algorithm?</a:t>
-            </a:r>
+              <a:t> to solve the problem</a:t>
+            </a:r>
+            <a:endParaRPr lang="en-GB" i="1" dirty="0"/>
           </a:p>
           <a:p>
             <a:r>
@@ -20538,7 +20528,7 @@
         </p:spPr>
         <p:txBody>
           <a:bodyPr>
-            <a:normAutofit lnSpcReduction="10000"/>
+            <a:normAutofit/>
           </a:bodyPr>
           <a:lstStyle/>
           <a:p>
@@ -20583,20 +20573,11 @@
           <a:p>
             <a:r>
               <a:rPr lang="en-GB" dirty="0"/>
-              <a:t>Create and edit files/documents</a:t>
+              <a:t>Create and edit text files and documents</a:t>
             </a:r>
           </a:p>
           <a:p>
             <a:endParaRPr lang="en-GB" dirty="0"/>
-          </a:p>
-          <a:p>
-            <a:endParaRPr lang="en-GB" dirty="0"/>
-          </a:p>
-          <a:p>
-            <a:r>
-              <a:rPr lang="en-GB" dirty="0"/>
-              <a:t>Not a tablet or smartphone</a:t>
-            </a:r>
           </a:p>
         </p:txBody>
       </p:sp>
@@ -20619,77 +20600,33 @@
         <p:spPr/>
         <p:txBody>
           <a:bodyPr>
-            <a:normAutofit lnSpcReduction="10000"/>
+            <a:normAutofit/>
           </a:bodyPr>
           <a:lstStyle/>
           <a:p>
             <a:r>
-              <a:rPr lang="en-GB" dirty="0"/>
-              <a:t>There are ‘cloud based’ Python environments that you can use solely via your browser:</a:t>
-            </a:r>
-          </a:p>
-          <a:p>
-            <a:pPr lvl="1"/>
-            <a:r>
-              <a:rPr lang="en-GB" dirty="0">
-                <a:hlinkClick r:id="rId2"/>
-              </a:rPr>
-              <a:t>www.replit.com</a:t>
-            </a:r>
-            <a:r>
-              <a:rPr lang="en-GB" dirty="0"/>
-              <a:t> </a:t>
-            </a:r>
-          </a:p>
-          <a:p>
-            <a:pPr lvl="1"/>
-            <a:r>
-              <a:rPr lang="en-GB" dirty="0">
-                <a:hlinkClick r:id="rId3"/>
-              </a:rPr>
-              <a:t>www.pythonanywhere.com</a:t>
-            </a:r>
-            <a:r>
-              <a:rPr lang="en-GB" dirty="0"/>
-              <a:t> </a:t>
-            </a:r>
-          </a:p>
-          <a:p>
-            <a:pPr lvl="1"/>
-            <a:r>
-              <a:rPr lang="en-GB" dirty="0">
-                <a:hlinkClick r:id="rId4"/>
-              </a:rPr>
-              <a:t>docs.aws.amazon.com/cloud9/</a:t>
-            </a:r>
-            <a:endParaRPr lang="en-GB" dirty="0"/>
-          </a:p>
-          <a:p>
-            <a:pPr lvl="1"/>
-            <a:r>
-              <a:rPr lang="en-GB" dirty="0">
-                <a:hlinkClick r:id="rId5"/>
-              </a:rPr>
-              <a:t>anaconda.cloud</a:t>
-            </a:r>
-            <a:endParaRPr lang="en-GB" dirty="0"/>
+              <a:rPr lang="en-GB" b="1" i="1" dirty="0"/>
+              <a:t>Not</a:t>
+            </a:r>
+            <a:r>
+              <a:rPr lang="en-GB" i="1" dirty="0"/>
+              <a:t> a tablet</a:t>
+            </a:r>
+          </a:p>
+          <a:p>
+            <a:r>
+              <a:rPr lang="en-GB" b="1" i="1" dirty="0"/>
+              <a:t>Not</a:t>
+            </a:r>
+            <a:r>
+              <a:rPr lang="en-GB" i="1" dirty="0"/>
+              <a:t> a smartphone</a:t>
+            </a:r>
           </a:p>
           <a:p>
             <a:pPr marL="0" indent="0">
               <a:buNone/>
             </a:pPr>
-            <a:endParaRPr lang="en-GB" dirty="0"/>
-          </a:p>
-          <a:p>
-            <a:pPr marL="0" indent="0">
-              <a:buNone/>
-            </a:pPr>
-            <a:r>
-              <a:rPr lang="en-GB" dirty="0"/>
-              <a:t>But that’s another layer of learning you would need to work through</a:t>
-            </a:r>
-          </a:p>
-          <a:p>
             <a:endParaRPr lang="en-GB" dirty="0"/>
           </a:p>
         </p:txBody>
@@ -21085,67 +21022,6 @@
                       </p:childTnLst>
                     </p:cTn>
                   </p:par>
-                  <p:par>
-                    <p:cTn id="32" fill="hold">
-                      <p:stCondLst>
-                        <p:cond delay="indefinite"/>
-                      </p:stCondLst>
-                      <p:childTnLst>
-                        <p:par>
-                          <p:cTn id="33" fill="hold">
-                            <p:stCondLst>
-                              <p:cond delay="0"/>
-                            </p:stCondLst>
-                            <p:childTnLst>
-                              <p:par>
-                                <p:cTn id="34" presetID="10" presetClass="entr" presetSubtype="0" fill="hold" grpId="0" nodeType="clickEffect">
-                                  <p:stCondLst>
-                                    <p:cond delay="0"/>
-                                  </p:stCondLst>
-                                  <p:childTnLst>
-                                    <p:set>
-                                      <p:cBhvr>
-                                        <p:cTn id="35" dur="1" fill="hold">
-                                          <p:stCondLst>
-                                            <p:cond delay="0"/>
-                                          </p:stCondLst>
-                                        </p:cTn>
-                                        <p:tgtEl>
-                                          <p:spTgt spid="3">
-                                            <p:txEl>
-                                              <p:pRg st="9" end="9"/>
-                                            </p:txEl>
-                                          </p:spTgt>
-                                        </p:tgtEl>
-                                        <p:attrNameLst>
-                                          <p:attrName>style.visibility</p:attrName>
-                                        </p:attrNameLst>
-                                      </p:cBhvr>
-                                      <p:to>
-                                        <p:strVal val="visible"/>
-                                      </p:to>
-                                    </p:set>
-                                    <p:animEffect transition="in" filter="fade">
-                                      <p:cBhvr>
-                                        <p:cTn id="36" dur="500"/>
-                                        <p:tgtEl>
-                                          <p:spTgt spid="3">
-                                            <p:txEl>
-                                              <p:pRg st="9" end="9"/>
-                                            </p:txEl>
-                                          </p:spTgt>
-                                        </p:tgtEl>
-                                      </p:cBhvr>
-                                    </p:animEffect>
-                                  </p:childTnLst>
-                                </p:cTn>
-                              </p:par>
-                            </p:childTnLst>
-                          </p:cTn>
-                        </p:par>
-                      </p:childTnLst>
-                    </p:cTn>
-                  </p:par>
                 </p:childTnLst>
               </p:cTn>
               <p:prevCondLst>
@@ -22177,7 +22053,7 @@
             <a:pPr lvl="1"/>
             <a:r>
               <a:rPr lang="en-GB" dirty="0"/>
-              <a:t>and much, much more</a:t>
+              <a:t>AI coding assistants</a:t>
             </a:r>
           </a:p>
           <a:p>
@@ -23500,13 +23376,13 @@
           <a:p>
             <a:r>
               <a:rPr lang="en-GB" dirty="0"/>
-              <a:t>If you get a ‘Traceback’ message try again.</a:t>
-            </a:r>
-          </a:p>
-          <a:p>
-            <a:r>
-              <a:rPr lang="en-GB" dirty="0"/>
-              <a:t>If you get the response 4 then you are programming in Python</a:t>
+              <a:t>If you get a ‘Traceback’ message, try again.</a:t>
+            </a:r>
+          </a:p>
+          <a:p>
+            <a:r>
+              <a:rPr lang="en-GB" dirty="0"/>
+              <a:t>If python answers 4 then you are programming in Python</a:t>
             </a:r>
           </a:p>
         </p:txBody>

</xml_diff>